<commit_message>
"final commit before submission"
</commit_message>
<xml_diff>
--- a/Report - Operation_and_Metric_Analytics.pptx
+++ b/Report - Operation_and_Metric_Analytics.pptx
@@ -30655,7 +30655,7 @@
           <a:p>
             <a:r>
               <a:rPr lang="en-US" dirty="0"/>
-              <a:t>Steps for finding the percentage share of each language : </a:t>
+              <a:t>Steps for finding the duplicate rows : </a:t>
             </a:r>
           </a:p>
           <a:p>
@@ -32679,7 +32679,7 @@
           <a:p>
             <a:r>
               <a:rPr lang="en-US" dirty="0"/>
-              <a:t>Steps for finding the percentage share of each language : </a:t>
+              <a:t>Steps for finding the weekly user engagement : </a:t>
             </a:r>
           </a:p>
           <a:p>
@@ -34632,7 +34632,7 @@
           <a:p>
             <a:r>
               <a:rPr lang="en-US" sz="2000" dirty="0"/>
-              <a:t>Steps for finding the percentage share of each language : </a:t>
+              <a:t>Steps for finding the user growth analysis : </a:t>
             </a:r>
           </a:p>
           <a:p>

</xml_diff>